<commit_message>
Update gene expression analysis scheme figure
</commit_message>
<xml_diff>
--- a/Figures/GE_analysis_scheme.pptx
+++ b/Figures/GE_analysis_scheme.pptx
@@ -302,7 +302,7 @@
           <a:p>
             <a:fld id="{09045D75-151D-004C-BF3E-5C8C49CD8C92}" type="datetimeFigureOut">
               <a:rPr lang="en-US" smtClean="0"/>
-              <a:t>1/29/18</a:t>
+              <a:t>5/24/21</a:t>
             </a:fld>
             <a:endParaRPr lang="en-GB"/>
           </a:p>
@@ -470,7 +470,7 @@
           <a:p>
             <a:fld id="{09045D75-151D-004C-BF3E-5C8C49CD8C92}" type="datetimeFigureOut">
               <a:rPr lang="en-US" smtClean="0"/>
-              <a:t>1/29/18</a:t>
+              <a:t>5/24/21</a:t>
             </a:fld>
             <a:endParaRPr lang="en-GB"/>
           </a:p>
@@ -648,7 +648,7 @@
           <a:p>
             <a:fld id="{09045D75-151D-004C-BF3E-5C8C49CD8C92}" type="datetimeFigureOut">
               <a:rPr lang="en-US" smtClean="0"/>
-              <a:t>1/29/18</a:t>
+              <a:t>5/24/21</a:t>
             </a:fld>
             <a:endParaRPr lang="en-GB"/>
           </a:p>
@@ -816,7 +816,7 @@
           <a:p>
             <a:fld id="{09045D75-151D-004C-BF3E-5C8C49CD8C92}" type="datetimeFigureOut">
               <a:rPr lang="en-US" smtClean="0"/>
-              <a:t>1/29/18</a:t>
+              <a:t>5/24/21</a:t>
             </a:fld>
             <a:endParaRPr lang="en-GB"/>
           </a:p>
@@ -1061,7 +1061,7 @@
           <a:p>
             <a:fld id="{09045D75-151D-004C-BF3E-5C8C49CD8C92}" type="datetimeFigureOut">
               <a:rPr lang="en-US" smtClean="0"/>
-              <a:t>1/29/18</a:t>
+              <a:t>5/24/21</a:t>
             </a:fld>
             <a:endParaRPr lang="en-GB"/>
           </a:p>
@@ -1346,7 +1346,7 @@
           <a:p>
             <a:fld id="{09045D75-151D-004C-BF3E-5C8C49CD8C92}" type="datetimeFigureOut">
               <a:rPr lang="en-US" smtClean="0"/>
-              <a:t>1/29/18</a:t>
+              <a:t>5/24/21</a:t>
             </a:fld>
             <a:endParaRPr lang="en-GB"/>
           </a:p>
@@ -1770,7 +1770,7 @@
           <a:p>
             <a:fld id="{09045D75-151D-004C-BF3E-5C8C49CD8C92}" type="datetimeFigureOut">
               <a:rPr lang="en-US" smtClean="0"/>
-              <a:t>1/29/18</a:t>
+              <a:t>5/24/21</a:t>
             </a:fld>
             <a:endParaRPr lang="en-GB"/>
           </a:p>
@@ -1887,7 +1887,7 @@
           <a:p>
             <a:fld id="{09045D75-151D-004C-BF3E-5C8C49CD8C92}" type="datetimeFigureOut">
               <a:rPr lang="en-US" smtClean="0"/>
-              <a:t>1/29/18</a:t>
+              <a:t>5/24/21</a:t>
             </a:fld>
             <a:endParaRPr lang="en-GB"/>
           </a:p>
@@ -1982,7 +1982,7 @@
           <a:p>
             <a:fld id="{09045D75-151D-004C-BF3E-5C8C49CD8C92}" type="datetimeFigureOut">
               <a:rPr lang="en-US" smtClean="0"/>
-              <a:t>1/29/18</a:t>
+              <a:t>5/24/21</a:t>
             </a:fld>
             <a:endParaRPr lang="en-GB"/>
           </a:p>
@@ -2257,7 +2257,7 @@
           <a:p>
             <a:fld id="{09045D75-151D-004C-BF3E-5C8C49CD8C92}" type="datetimeFigureOut">
               <a:rPr lang="en-US" smtClean="0"/>
-              <a:t>1/29/18</a:t>
+              <a:t>5/24/21</a:t>
             </a:fld>
             <a:endParaRPr lang="en-GB"/>
           </a:p>
@@ -2509,7 +2509,7 @@
           <a:p>
             <a:fld id="{09045D75-151D-004C-BF3E-5C8C49CD8C92}" type="datetimeFigureOut">
               <a:rPr lang="en-US" smtClean="0"/>
-              <a:t>1/29/18</a:t>
+              <a:t>5/24/21</a:t>
             </a:fld>
             <a:endParaRPr lang="en-GB"/>
           </a:p>
@@ -2720,7 +2720,7 @@
           <a:p>
             <a:fld id="{09045D75-151D-004C-BF3E-5C8C49CD8C92}" type="datetimeFigureOut">
               <a:rPr lang="en-US" smtClean="0"/>
-              <a:t>1/29/18</a:t>
+              <a:t>5/24/21</a:t>
             </a:fld>
             <a:endParaRPr lang="en-GB"/>
           </a:p>
@@ -5370,7 +5370,7 @@
             </a:r>
             <a:r>
               <a:rPr lang="en-GB" sz="800" i="1" dirty="0"/>
-              <a:t>.</a:t>
+              <a:t>R --file=.</a:t>
             </a:r>
             <a:r>
               <a:rPr lang="en-GB" sz="800" dirty="0"/>
@@ -5472,11 +5472,11 @@
             </a:r>
             <a:r>
               <a:rPr lang="en-GB" sz="800" i="1" dirty="0"/>
-              <a:t>.</a:t>
-            </a:r>
-            <a:r>
-              <a:rPr lang="en-GB" sz="800" dirty="0"/>
-              <a:t>/</a:t>
+              <a:t>R --file=.</a:t>
+            </a:r>
+            <a:r>
+              <a:rPr lang="en-GB" sz="800" dirty="0"/>
+              <a:t>/ </a:t>
             </a:r>
             <a:r>
               <a:rPr lang="en-GB" sz="800" i="1" dirty="0" err="1"/>
@@ -5484,41 +5484,49 @@
             </a:r>
             <a:r>
               <a:rPr lang="en-GB" sz="800" i="1" dirty="0"/>
+              <a:t> --</a:t>
+            </a:r>
+            <a:r>
+              <a:rPr lang="en-GB" sz="800" i="1" dirty="0" err="1"/>
+              <a:t>args</a:t>
+            </a:r>
+            <a:r>
+              <a:rPr lang="en-GB" sz="800" i="1" dirty="0"/>
+              <a:t> </a:t>
+            </a:r>
+            <a:r>
+              <a:rPr lang="en-GB" sz="800" spc="-10" dirty="0"/>
+              <a:t>“</a:t>
+            </a:r>
+            <a:r>
+              <a:rPr lang="en-GB" sz="800" b="1" spc="-10" dirty="0" err="1"/>
+              <a:t>genes_Ensembl.gtf.gene_info.txt</a:t>
+            </a:r>
+            <a:r>
+              <a:rPr lang="en-GB" sz="800" i="1" spc="-10" dirty="0"/>
+              <a:t>”</a:t>
+            </a:r>
+            <a:r>
+              <a:rPr lang="en-GB" sz="800" spc="-10" dirty="0"/>
               <a:t>  </a:t>
             </a:r>
             <a:r>
-              <a:rPr lang="en-GB" sz="800" dirty="0"/>
+              <a:rPr lang="en-GB" sz="800" i="1" spc="-10" dirty="0"/>
               <a:t>“</a:t>
             </a:r>
             <a:r>
-              <a:rPr lang="en-GB" sz="800" b="1" dirty="0" err="1"/>
-              <a:t>genes_Ensembl.gtf.gene_info.txt</a:t>
-            </a:r>
-            <a:r>
-              <a:rPr lang="en-GB" sz="800" i="1" dirty="0"/>
+              <a:rPr lang="en-GB" sz="800" spc="-10" dirty="0"/>
+              <a:t>/</a:t>
+            </a:r>
+            <a:r>
+              <a:rPr lang="en-GB" sz="800" b="1" i="1" spc="-10" dirty="0" err="1"/>
+              <a:t>project_dir</a:t>
+            </a:r>
+            <a:r>
+              <a:rPr lang="en-GB" sz="800" i="1" spc="-10" dirty="0"/>
               <a:t>”</a:t>
             </a:r>
-            <a:r>
-              <a:rPr lang="en-GB" sz="800" dirty="0"/>
-              <a:t>  </a:t>
-            </a:r>
-            <a:r>
-              <a:rPr lang="en-GB" sz="800" i="1" dirty="0"/>
-              <a:t>“</a:t>
-            </a:r>
-            <a:r>
-              <a:rPr lang="en-GB" sz="800" dirty="0"/>
-              <a:t>/</a:t>
-            </a:r>
-            <a:r>
-              <a:rPr lang="en-GB" sz="800" b="1" i="1" dirty="0" err="1"/>
-              <a:t>project_dir</a:t>
-            </a:r>
-            <a:r>
-              <a:rPr lang="en-GB" sz="800" i="1" dirty="0"/>
-              <a:t>”</a:t>
-            </a:r>
-            <a:endParaRPr lang="en-GB" sz="800" b="1" i="1" dirty="0"/>
+            <a:endParaRPr lang="en-GB" sz="800" b="1" i="1" spc="-10" dirty="0"/>
           </a:p>
           <a:p>
             <a:endParaRPr lang="en-GB" sz="300" b="1" i="1" dirty="0"/>
@@ -5549,16 +5557,8 @@
               <a:t>/</a:t>
             </a:r>
             <a:r>
-              <a:rPr lang="en-GB" sz="800" b="1" err="1"/>
-              <a:t>RNAseq</a:t>
-            </a:r>
-            <a:r>
-              <a:rPr lang="en-GB" sz="800" b="1"/>
-              <a:t>_count</a:t>
-            </a:r>
-            <a:r>
               <a:rPr lang="en-GB" sz="800" b="1" dirty="0" err="1"/>
-              <a:t>_matrix.txt</a:t>
+              <a:t>RNAseq_count_matrix.txt</a:t>
             </a:r>
             <a:endParaRPr lang="en-GB" sz="800" b="1" i="1" dirty="0"/>
           </a:p>
@@ -5697,7 +5697,15 @@
           <a:p>
             <a:r>
               <a:rPr lang="en-GB" sz="800" dirty="0"/>
-              <a:t>Command:    ./</a:t>
+              <a:t>Command:    </a:t>
+            </a:r>
+            <a:r>
+              <a:rPr lang="en-GB" sz="800" i="1" dirty="0"/>
+              <a:t>R --file=.</a:t>
+            </a:r>
+            <a:r>
+              <a:rPr lang="en-GB" sz="800" dirty="0"/>
+              <a:t>/ </a:t>
             </a:r>
             <a:r>
               <a:rPr lang="en-GB" sz="800" i="1" dirty="0" err="1"/>
@@ -5705,15 +5713,15 @@
             </a:r>
             <a:r>
               <a:rPr lang="en-GB" sz="800" i="1" dirty="0"/>
-              <a:t>_[platform].R </a:t>
-            </a:r>
-            <a:r>
-              <a:rPr lang="en-GB" sz="800" b="1" i="1" dirty="0"/>
-              <a:t> </a:t>
-            </a:r>
-            <a:r>
-              <a:rPr lang="en-GB" sz="800" i="1" dirty="0"/>
-              <a:t>“</a:t>
+              <a:t>_[platform].R  --</a:t>
+            </a:r>
+            <a:r>
+              <a:rPr lang="en-GB" sz="800" i="1" dirty="0" err="1"/>
+              <a:t>args</a:t>
+            </a:r>
+            <a:r>
+              <a:rPr lang="en-GB" sz="800" i="1" dirty="0"/>
+              <a:t> “</a:t>
             </a:r>
             <a:r>
               <a:rPr lang="en-GB" sz="800" dirty="0"/>
@@ -5815,11 +5823,7 @@
             </a:r>
             <a:r>
               <a:rPr lang="en-GB" sz="800" b="1" dirty="0"/>
-              <a:t>_</a:t>
-            </a:r>
-            <a:r>
-              <a:rPr lang="en-GB" sz="800" b="1"/>
-              <a:t>[platform]_</a:t>
+              <a:t>_[platform]_</a:t>
             </a:r>
             <a:r>
               <a:rPr lang="en-GB" sz="800" b="1" dirty="0" err="1"/>
@@ -5863,23 +5867,23 @@
             </a:r>
             <a:r>
               <a:rPr lang="en-GB" sz="800" i="1" dirty="0"/>
-              <a:t>.</a:t>
-            </a:r>
-            <a:r>
-              <a:rPr lang="en-GB" sz="800" dirty="0"/>
-              <a:t>/</a:t>
-            </a:r>
-            <a:r>
-              <a:rPr lang="en-GB" sz="800" i="1" dirty="0"/>
-              <a:t>GenExpressionComb_Illum_HT_12_V3.R </a:t>
-            </a:r>
-            <a:r>
-              <a:rPr lang="en-GB" sz="800" b="1" i="1" dirty="0"/>
-              <a:t> </a:t>
-            </a:r>
-            <a:r>
-              <a:rPr lang="en-GB" sz="800" i="1" dirty="0"/>
-              <a:t>“</a:t>
+              <a:t>R --file=.</a:t>
+            </a:r>
+            <a:r>
+              <a:rPr lang="en-GB" sz="800" dirty="0"/>
+              <a:t>/ </a:t>
+            </a:r>
+            <a:r>
+              <a:rPr lang="en-GB" sz="800" i="1" dirty="0"/>
+              <a:t>GenExpressionComb_Illum_HT_12_V3.R --</a:t>
+            </a:r>
+            <a:r>
+              <a:rPr lang="en-GB" sz="800" i="1" dirty="0" err="1"/>
+              <a:t>args</a:t>
+            </a:r>
+            <a:r>
+              <a:rPr lang="en-GB" sz="800" i="1" dirty="0"/>
+              <a:t> “</a:t>
             </a:r>
             <a:r>
               <a:rPr lang="en-GB" sz="800" dirty="0"/>
@@ -6046,11 +6050,11 @@
             </a:r>
             <a:r>
               <a:rPr lang="en-GB" sz="800" i="1" dirty="0"/>
-              <a:t>.</a:t>
-            </a:r>
-            <a:r>
-              <a:rPr lang="en-GB" sz="800" dirty="0"/>
-              <a:t>/</a:t>
+              <a:t>R --file=.</a:t>
+            </a:r>
+            <a:r>
+              <a:rPr lang="en-GB" sz="800" dirty="0"/>
+              <a:t>/ </a:t>
             </a:r>
             <a:r>
               <a:rPr lang="en-GB" sz="800" i="1" dirty="0"/>
@@ -6062,7 +6066,15 @@
             </a:r>
             <a:r>
               <a:rPr lang="en-GB" sz="800" i="1" dirty="0"/>
-              <a:t>  </a:t>
+              <a:t> --</a:t>
+            </a:r>
+            <a:r>
+              <a:rPr lang="en-GB" sz="800" i="1" dirty="0" err="1"/>
+              <a:t>args</a:t>
+            </a:r>
+            <a:r>
+              <a:rPr lang="en-GB" sz="800" i="1" dirty="0"/>
+              <a:t> </a:t>
             </a:r>
             <a:r>
               <a:rPr lang="en-GB" sz="800" b="1" i="1" dirty="0"/>
@@ -6241,12 +6253,12 @@
         </p:nvCxnSpPr>
         <p:spPr>
           <a:xfrm rot="16200000" flipH="1">
-            <a:off x="4089218" y="15300686"/>
-            <a:ext cx="625899" cy="2761134"/>
+            <a:off x="4066134" y="15277603"/>
+            <a:ext cx="672066" cy="2761134"/>
           </a:xfrm>
           <a:prstGeom prst="bentConnector3">
             <a:avLst>
-              <a:gd name="adj1" fmla="val 62175"/>
+              <a:gd name="adj1" fmla="val 50000"/>
             </a:avLst>
           </a:prstGeom>
           <a:ln w="12700">
@@ -6607,7 +6619,7 @@
         <p:spPr>
           <a:xfrm>
             <a:off x="620863" y="13547286"/>
-            <a:ext cx="4801480" cy="976160"/>
+            <a:ext cx="4801480" cy="1099271"/>
           </a:xfrm>
           <a:prstGeom prst="rect">
             <a:avLst/>
@@ -6643,15 +6655,35 @@
           <a:p>
             <a:r>
               <a:rPr lang="en-GB" sz="800" dirty="0"/>
-              <a:t>Command:    ./</a:t>
+              <a:t>Command:     </a:t>
+            </a:r>
+            <a:r>
+              <a:rPr lang="en-GB" sz="800" i="1" dirty="0"/>
+              <a:t>R --file=.</a:t>
+            </a:r>
+            <a:r>
+              <a:rPr lang="en-GB" sz="800" dirty="0"/>
+              <a:t>/</a:t>
+            </a:r>
+            <a:r>
+              <a:rPr lang="en-GB" sz="800" dirty="0" err="1"/>
+              <a:t>S</a:t>
             </a:r>
             <a:r>
               <a:rPr lang="en-GB" sz="800" i="1" dirty="0" err="1"/>
-              <a:t>Study_effect.R</a:t>
-            </a:r>
-            <a:r>
-              <a:rPr lang="en-GB" sz="800" i="1" dirty="0"/>
-              <a:t>  “</a:t>
+              <a:t>tudy_effect.R</a:t>
+            </a:r>
+            <a:r>
+              <a:rPr lang="en-GB" sz="800" i="1" dirty="0"/>
+              <a:t> --</a:t>
+            </a:r>
+            <a:r>
+              <a:rPr lang="en-GB" sz="800" i="1" dirty="0" err="1"/>
+              <a:t>args</a:t>
+            </a:r>
+            <a:r>
+              <a:rPr lang="en-GB" sz="800" i="1" dirty="0"/>
+              <a:t> “</a:t>
             </a:r>
             <a:r>
               <a:rPr lang="en-GB" sz="800" dirty="0"/>
@@ -6687,11 +6719,13 @@
             </a:r>
             <a:r>
               <a:rPr lang="en-GB" sz="800" i="1" dirty="0"/>
-              <a:t>”  [optional]  </a:t>
-            </a:r>
+              <a:t>”  [optional]            </a:t>
+            </a:r>
+          </a:p>
+          <a:p>
             <a:r>
               <a:rPr lang="en-GB" sz="800" b="1" i="1" dirty="0"/>
-              <a:t>“</a:t>
+              <a:t>                         “</a:t>
             </a:r>
             <a:r>
               <a:rPr lang="en-GB" sz="800" b="1" i="1" dirty="0" err="1"/>
@@ -6833,7 +6867,7 @@
         <p:spPr>
           <a:xfrm>
             <a:off x="6100536" y="13558077"/>
-            <a:ext cx="4774989" cy="976160"/>
+            <a:ext cx="4774989" cy="1099271"/>
           </a:xfrm>
           <a:prstGeom prst="rect">
             <a:avLst/>
@@ -6869,7 +6903,15 @@
           <a:p>
             <a:r>
               <a:rPr lang="en-GB" sz="800" dirty="0"/>
-              <a:t>Command:    ./</a:t>
+              <a:t>Command:    </a:t>
+            </a:r>
+            <a:r>
+              <a:rPr lang="en-GB" sz="800" i="1" dirty="0"/>
+              <a:t>R --file=.</a:t>
+            </a:r>
+            <a:r>
+              <a:rPr lang="en-GB" sz="800" dirty="0"/>
+              <a:t>/</a:t>
             </a:r>
             <a:r>
               <a:rPr lang="en-GB" sz="800" i="1" dirty="0" err="1"/>
@@ -6877,7 +6919,15 @@
             </a:r>
             <a:r>
               <a:rPr lang="en-GB" sz="800" i="1" dirty="0"/>
-              <a:t>  “</a:t>
+              <a:t> --</a:t>
+            </a:r>
+            <a:r>
+              <a:rPr lang="en-GB" sz="800" i="1" dirty="0" err="1"/>
+              <a:t>args</a:t>
+            </a:r>
+            <a:r>
+              <a:rPr lang="en-GB" sz="800" i="1" dirty="0"/>
+              <a:t> “</a:t>
             </a:r>
             <a:r>
               <a:rPr lang="en-GB" sz="800" dirty="0"/>
@@ -6917,7 +6967,13 @@
             </a:r>
             <a:r>
               <a:rPr lang="en-GB" sz="800" b="1" i="1" dirty="0"/>
-              <a:t>  “</a:t>
+              <a:t>   </a:t>
+            </a:r>
+          </a:p>
+          <a:p>
+            <a:r>
+              <a:rPr lang="en-GB" sz="800" b="1" i="1" dirty="0"/>
+              <a:t>                        “</a:t>
             </a:r>
             <a:r>
               <a:rPr lang="en-GB" sz="800" b="1" i="1" dirty="0" err="1"/>
@@ -7047,7 +7103,7 @@
         <p:spPr>
           <a:xfrm>
             <a:off x="620860" y="14884312"/>
-            <a:ext cx="4801480" cy="1483992"/>
+            <a:ext cx="4801480" cy="1437825"/>
           </a:xfrm>
           <a:prstGeom prst="rect">
             <a:avLst/>
@@ -7082,7 +7138,15 @@
           <a:p>
             <a:r>
               <a:rPr lang="en-GB" sz="800" dirty="0"/>
-              <a:t>Command:    ./</a:t>
+              <a:t>Command:    </a:t>
+            </a:r>
+            <a:r>
+              <a:rPr lang="en-GB" sz="800" i="1" dirty="0"/>
+              <a:t>R --file=.</a:t>
+            </a:r>
+            <a:r>
+              <a:rPr lang="en-GB" sz="800" dirty="0"/>
+              <a:t>/</a:t>
             </a:r>
             <a:r>
               <a:rPr lang="en-GB" sz="800" i="1" dirty="0" err="1"/>
@@ -7090,15 +7154,15 @@
             </a:r>
             <a:r>
               <a:rPr lang="en-GB" sz="800" i="1" dirty="0"/>
-              <a:t> </a:t>
-            </a:r>
-            <a:r>
-              <a:rPr lang="en-GB" sz="800" b="1" i="1" dirty="0"/>
-              <a:t> </a:t>
-            </a:r>
-            <a:r>
-              <a:rPr lang="en-GB" sz="800" i="1" dirty="0"/>
-              <a:t>“</a:t>
+              <a:t> --</a:t>
+            </a:r>
+            <a:r>
+              <a:rPr lang="en-GB" sz="800" i="1" dirty="0" err="1"/>
+              <a:t>args</a:t>
+            </a:r>
+            <a:r>
+              <a:rPr lang="en-GB" sz="800" i="1" dirty="0"/>
+              <a:t> “</a:t>
             </a:r>
             <a:r>
               <a:rPr lang="en-GB" sz="800" dirty="0"/>
@@ -7130,20 +7194,17 @@
             </a:r>
             <a:r>
               <a:rPr lang="en-GB" sz="800" b="1" dirty="0"/>
-              <a:t> dataset_2</a:t>
-            </a:r>
-            <a:r>
-              <a:rPr lang="en-GB" sz="800" i="1" dirty="0"/>
-              <a:t>” </a:t>
-            </a:r>
-          </a:p>
-          <a:p>
-            <a:endParaRPr lang="en-GB" sz="300" i="1" dirty="0"/>
-          </a:p>
-          <a:p>
-            <a:r>
-              <a:rPr lang="en-GB" sz="800" i="1" dirty="0"/>
-              <a:t>                       “</a:t>
+              <a:t> </a:t>
+            </a:r>
+          </a:p>
+          <a:p>
+            <a:r>
+              <a:rPr lang="en-GB" sz="800" b="1" dirty="0"/>
+              <a:t>                        dataset_2</a:t>
+            </a:r>
+            <a:r>
+              <a:rPr lang="en-GB" sz="800" i="1" dirty="0"/>
+              <a:t>”  “</a:t>
             </a:r>
             <a:r>
               <a:rPr lang="en-GB" sz="800" b="1" i="1" dirty="0"/>
@@ -7370,7 +7431,15 @@
           <a:p>
             <a:r>
               <a:rPr lang="en-GB" sz="800" dirty="0"/>
-              <a:t>Command:    ./</a:t>
+              <a:t>Command:    </a:t>
+            </a:r>
+            <a:r>
+              <a:rPr lang="en-GB" sz="800" i="1" dirty="0"/>
+              <a:t>R --file=.</a:t>
+            </a:r>
+            <a:r>
+              <a:rPr lang="en-GB" sz="800" dirty="0"/>
+              <a:t>/</a:t>
             </a:r>
             <a:r>
               <a:rPr lang="en-GB" sz="800" i="1" dirty="0" err="1"/>
@@ -7378,7 +7447,15 @@
             </a:r>
             <a:r>
               <a:rPr lang="en-GB" sz="800" i="1" dirty="0"/>
-              <a:t>   “</a:t>
+              <a:t> --</a:t>
+            </a:r>
+            <a:r>
+              <a:rPr lang="en-GB" sz="800" i="1" dirty="0" err="1"/>
+              <a:t>args</a:t>
+            </a:r>
+            <a:r>
+              <a:rPr lang="en-GB" sz="800" i="1" dirty="0"/>
+              <a:t> “</a:t>
             </a:r>
             <a:r>
               <a:rPr lang="en-GB" sz="800" dirty="0"/>
@@ -7594,8 +7671,8 @@
         </p:nvCxnSpPr>
         <p:spPr>
           <a:xfrm flipH="1">
-            <a:off x="3021600" y="14523446"/>
-            <a:ext cx="3" cy="360866"/>
+            <a:off x="3021600" y="14646557"/>
+            <a:ext cx="3" cy="237755"/>
           </a:xfrm>
           <a:prstGeom prst="straightConnector1">
             <a:avLst/>
@@ -7635,8 +7712,8 @@
         </p:nvCxnSpPr>
         <p:spPr>
           <a:xfrm>
-            <a:off x="8488031" y="14534237"/>
-            <a:ext cx="3385" cy="349928"/>
+            <a:off x="8488031" y="14657348"/>
+            <a:ext cx="3385" cy="226817"/>
           </a:xfrm>
           <a:prstGeom prst="straightConnector1">
             <a:avLst/>

</xml_diff>